<commit_message>
Added post plagiarism work
</commit_message>
<xml_diff>
--- a/EECS6699_ SqueezeNet.pptx
+++ b/EECS6699_ SqueezeNet.pptx
@@ -23161,7 +23161,7 @@
         <p:spPr>
           <a:xfrm>
             <a:off x="57775" y="762850"/>
-            <a:ext cx="5262600" cy="2385900"/>
+            <a:ext cx="5262600" cy="2586000"/>
           </a:xfrm>
           <a:prstGeom prst="rect">
             <a:avLst/>
@@ -23198,7 +23198,7 @@
                 <a:cs typeface="Calibri"/>
                 <a:sym typeface="Calibri"/>
               </a:rPr>
-              <a:t>Initially pruned connections are recovered and initialized anew</a:t>
+              <a:t>Initially the pruned connections are recovered from the network and initialized anew</a:t>
             </a:r>
             <a:endParaRPr sz="1300">
               <a:latin typeface="Calibri"/>
@@ -23249,7 +23249,7 @@
                 <a:cs typeface="Calibri"/>
                 <a:sym typeface="Calibri"/>
               </a:rPr>
-              <a:t>Entire network is trained on a reduced learning rate (1/10th) of the original rate - since the sparse network is already close to a good local minimum.</a:t>
+              <a:t>The entire network is trained on a reduced learning rate (1/10th) of the initialized rate - since the sparse network is already close to an optimal local minimum.</a:t>
             </a:r>
             <a:endParaRPr sz="1300">
               <a:latin typeface="Calibri"/>
@@ -23777,7 +23777,7 @@
                 <a:cs typeface="Calibri"/>
                 <a:sym typeface="Calibri"/>
               </a:rPr>
-              <a:t>Weight distribution is initially centered around zero with rapid tail decay. </a:t>
+              <a:t>Weight distribution is initially concentrated around zero with rapid tail decay. </a:t>
             </a:r>
             <a:endParaRPr sz="1300">
               <a:solidFill>
@@ -23887,7 +23887,7 @@
                 <a:cs typeface="Calibri"/>
                 <a:sym typeface="Calibri"/>
               </a:rPr>
-              <a:t>Pruned weights are then </a:t>
+              <a:t>Weights post pruning are then </a:t>
             </a:r>
             <a:r>
               <a:rPr lang="en" sz="1300">
@@ -23899,7 +23899,7 @@
                 <a:cs typeface="Calibri"/>
                 <a:sym typeface="Calibri"/>
               </a:rPr>
-              <a:t>re-initialized</a:t>
+              <a:t>re-assigned around</a:t>
             </a:r>
             <a:r>
               <a:rPr lang="en" sz="1300">
@@ -23911,7 +23911,7 @@
                 <a:cs typeface="Calibri"/>
                 <a:sym typeface="Calibri"/>
               </a:rPr>
-              <a:t> to zero at the start of re-dense training and eventually retrained alongside un-pruned weights.</a:t>
+              <a:t> zero at the start of re-dense training and eventually retrained alongside un-pruned weights.</a:t>
             </a:r>
             <a:endParaRPr sz="1300">
               <a:solidFill>
@@ -25100,7 +25100,7 @@
                 <a:cs typeface="Calibri"/>
                 <a:sym typeface="Calibri"/>
               </a:rPr>
-              <a:t> Helps reformulate the underlying mapping as a residual mapping, rather than expecting the stacked layers to directly fit a desired underlying mapping.</a:t>
+              <a:t> Helps reformulate the underlying mapping as a residual mapping, rather than anticipating the stacked layers to directly model a underlying mapping.</a:t>
             </a:r>
             <a:endParaRPr sz="1200">
               <a:latin typeface="Calibri"/>
@@ -25148,7 +25148,7 @@
                 <a:cs typeface="Calibri"/>
                 <a:sym typeface="Calibri"/>
               </a:rPr>
-              <a:t>If the desired underlying mapping is </a:t>
+              <a:t>If the underlying mapping is </a:t>
             </a:r>
             <a:r>
               <a:rPr i="1" lang="en" sz="1200">
@@ -25166,7 +25166,7 @@
                 <a:cs typeface="Calibri"/>
                 <a:sym typeface="Calibri"/>
               </a:rPr>
-              <a:t>, the residual learning framework lets the layers fit another mapping </a:t>
+              <a:t>, the residual learning framework lets the model fit another mapping </a:t>
             </a:r>
             <a:endParaRPr sz="1200">
               <a:latin typeface="Calibri"/>
@@ -25201,7 +25201,7 @@
                 <a:cs typeface="Calibri"/>
                 <a:sym typeface="Calibri"/>
               </a:rPr>
-              <a:t>, where </a:t>
+              <a:t>. Here </a:t>
             </a:r>
             <a:r>
               <a:rPr i="1" lang="en" sz="1200">
@@ -26809,7 +26809,7 @@
                 <a:cs typeface="Calibri"/>
                 <a:sym typeface="Calibri"/>
               </a:rPr>
-              <a:t> RMSprop adapts the learning rates for each parameter based on the root mean square (RMS) of recent gradients. This adaptiveness allows it to converge faster and more robustly, especially in scenarios where the gradients exhibit large variations or are sparse.</a:t>
+              <a:t> RMSprop changes the learning rates for every parameter based on the root mean square (RMS) of recent gradients. This adaptiveness allows it to converge faster and more robustly, especially in scenarios where the gradients exhibit large variations or are sparse.</a:t>
             </a:r>
             <a:endParaRPr sz="1100">
               <a:solidFill>
@@ -29135,7 +29135,31 @@
                 <a:cs typeface="Calibri"/>
                 <a:sym typeface="Calibri"/>
               </a:rPr>
-              <a:t> CNNs excel at automatically learning hierarchical patterns and features from raw data. Through successive convolutional and pooling layers, CNNs can identify low-level features like edges and textures, gradually building up to higher-level features like shapes, objects, and semantic concepts.</a:t>
+              <a:t> CNNs are adept at learning hierarchical patterns and features </a:t>
+            </a:r>
+            <a:r>
+              <a:rPr lang="en" sz="1200">
+                <a:solidFill>
+                  <a:schemeClr val="dk1"/>
+                </a:solidFill>
+                <a:latin typeface="Calibri"/>
+                <a:ea typeface="Calibri"/>
+                <a:cs typeface="Calibri"/>
+                <a:sym typeface="Calibri"/>
+              </a:rPr>
+              <a:t>automatically </a:t>
+            </a:r>
+            <a:r>
+              <a:rPr lang="en" sz="1200">
+                <a:solidFill>
+                  <a:schemeClr val="dk1"/>
+                </a:solidFill>
+                <a:latin typeface="Calibri"/>
+                <a:ea typeface="Calibri"/>
+                <a:cs typeface="Calibri"/>
+                <a:sym typeface="Calibri"/>
+              </a:rPr>
+              <a:t>from raw data. Using successive convolutional, pooling layers, and activation layers, CNNs can identify both, local-level features like edges and textures, and global-level features like shapes, objects, and semantic concepts.</a:t>
             </a:r>
             <a:endParaRPr sz="1200">
               <a:solidFill>
@@ -29207,7 +29231,7 @@
                 <a:cs typeface="Calibri"/>
                 <a:sym typeface="Calibri"/>
               </a:rPr>
-              <a:t> CNNs have revolutionized the field of computer vision by enabling tasks such as image classification, object detection, facial recognition, and image segmentation with unprecedented accuracy.</a:t>
+              <a:t> CNNs have revolutionized the field of computer vision by enabling image tasks such as classification, detection, and segmentation with competitive accuracy.</a:t>
             </a:r>
             <a:endParaRPr sz="1200">
               <a:solidFill>
@@ -31557,7 +31581,7 @@
                 <a:cs typeface="Calibri"/>
                 <a:sym typeface="Calibri"/>
               </a:rPr>
-              <a:t>Universal Approximation Theorem assures that a neural network with at least one single hidden layer can approximate any continuous function.</a:t>
+              <a:t>Universal Approximation Theorem assures that any neural network with at least one single hidden layer can approximate any continuous function within a certain error margin.</a:t>
             </a:r>
             <a:endParaRPr sz="1150">
               <a:solidFill>
@@ -34807,7 +34831,7 @@
                 <a:cs typeface="Calibri"/>
                 <a:sym typeface="Calibri"/>
               </a:rPr>
-              <a:t>odels are prone to capturing noise, rather than finding the intended pattern in the dataset, leading to </a:t>
+              <a:t>odels are prone to capturing background noise, instead of finding patterns in the dataset, which leads to </a:t>
             </a:r>
             <a:r>
               <a:rPr b="1" lang="en" sz="1300">
@@ -34831,7 +34855,7 @@
                 <a:cs typeface="Calibri"/>
                 <a:sym typeface="Calibri"/>
               </a:rPr>
-              <a:t> and high variance. Simply reducing the model capacity leads to </a:t>
+              <a:t> and high variance. Only decreasing the model capacity leads to </a:t>
             </a:r>
             <a:r>
               <a:rPr b="1" lang="en" sz="1300">
@@ -34951,7 +34975,7 @@
                 <a:cs typeface="Calibri"/>
                 <a:sym typeface="Calibri"/>
               </a:rPr>
-              <a:t>” approach - a novel training strategy that starts with conventional training, then regularizes the model with sparsity- constrained optimization, and finally increases the model capacity by restoring and re-training the pruned weights.</a:t>
+              <a:t>” approach - a novel training strategy that starts with conventional training methodology, then uses with optimization with sparsity constraints, and then increases the model capacity by recovering, reinitializing and re-training the weights.</a:t>
             </a:r>
             <a:endParaRPr sz="1300">
               <a:solidFill>
@@ -35852,9 +35876,9 @@
 </file>
 
 <file path=ppt/theme/theme2.xml><?xml version="1.0" encoding="utf-8"?>
-<a:theme xmlns:a="http://schemas.openxmlformats.org/drawingml/2006/main" xmlns:r="http://schemas.openxmlformats.org/officeDocument/2006/relationships" name="8_Office Theme">
+<a:theme xmlns:a="http://schemas.openxmlformats.org/drawingml/2006/main" xmlns:r="http://schemas.openxmlformats.org/officeDocument/2006/relationships">
   <a:themeElements>
-    <a:clrScheme name="Office">
+    <a:clrScheme name="Default">
       <a:dk1>
         <a:srgbClr val="000000"/>
       </a:dk1>
@@ -35862,34 +35886,34 @@
         <a:srgbClr val="FFFFFF"/>
       </a:lt1>
       <a:dk2>
-        <a:srgbClr val="1F497D"/>
+        <a:srgbClr val="158158"/>
       </a:dk2>
       <a:lt2>
-        <a:srgbClr val="EEECE1"/>
+        <a:srgbClr val="F3F3F3"/>
       </a:lt2>
       <a:accent1>
-        <a:srgbClr val="4F81BD"/>
+        <a:srgbClr val="058DC7"/>
       </a:accent1>
       <a:accent2>
-        <a:srgbClr val="C0504D"/>
+        <a:srgbClr val="50B432"/>
       </a:accent2>
       <a:accent3>
-        <a:srgbClr val="9BBB59"/>
+        <a:srgbClr val="ED561B"/>
       </a:accent3>
       <a:accent4>
-        <a:srgbClr val="8064A2"/>
+        <a:srgbClr val="EDEF00"/>
       </a:accent4>
       <a:accent5>
-        <a:srgbClr val="4BACC6"/>
+        <a:srgbClr val="24CBE5"/>
       </a:accent5>
       <a:accent6>
-        <a:srgbClr val="F79646"/>
+        <a:srgbClr val="64E572"/>
       </a:accent6>
       <a:hlink>
-        <a:srgbClr val="0000FF"/>
+        <a:srgbClr val="2200CC"/>
       </a:hlink>
       <a:folHlink>
-        <a:srgbClr val="800080"/>
+        <a:srgbClr val="551A8B"/>
       </a:folHlink>
     </a:clrScheme>
     <a:fontScheme name="Office">
@@ -36131,9 +36155,9 @@
 </file>
 
 <file path=ppt/theme/theme3.xml><?xml version="1.0" encoding="utf-8"?>
-<a:theme xmlns:a="http://schemas.openxmlformats.org/drawingml/2006/main" xmlns:r="http://schemas.openxmlformats.org/officeDocument/2006/relationships">
+<a:theme xmlns:a="http://schemas.openxmlformats.org/drawingml/2006/main" xmlns:r="http://schemas.openxmlformats.org/officeDocument/2006/relationships" name="8_Office Theme">
   <a:themeElements>
-    <a:clrScheme name="Default">
+    <a:clrScheme name="Office">
       <a:dk1>
         <a:srgbClr val="000000"/>
       </a:dk1>
@@ -36141,34 +36165,34 @@
         <a:srgbClr val="FFFFFF"/>
       </a:lt1>
       <a:dk2>
-        <a:srgbClr val="158158"/>
+        <a:srgbClr val="1F497D"/>
       </a:dk2>
       <a:lt2>
-        <a:srgbClr val="F3F3F3"/>
+        <a:srgbClr val="EEECE1"/>
       </a:lt2>
       <a:accent1>
-        <a:srgbClr val="058DC7"/>
+        <a:srgbClr val="4F81BD"/>
       </a:accent1>
       <a:accent2>
-        <a:srgbClr val="50B432"/>
+        <a:srgbClr val="C0504D"/>
       </a:accent2>
       <a:accent3>
-        <a:srgbClr val="ED561B"/>
+        <a:srgbClr val="9BBB59"/>
       </a:accent3>
       <a:accent4>
-        <a:srgbClr val="EDEF00"/>
+        <a:srgbClr val="8064A2"/>
       </a:accent4>
       <a:accent5>
-        <a:srgbClr val="24CBE5"/>
+        <a:srgbClr val="4BACC6"/>
       </a:accent5>
       <a:accent6>
-        <a:srgbClr val="64E572"/>
+        <a:srgbClr val="F79646"/>
       </a:accent6>
       <a:hlink>
-        <a:srgbClr val="2200CC"/>
+        <a:srgbClr val="0000FF"/>
       </a:hlink>
       <a:folHlink>
-        <a:srgbClr val="551A8B"/>
+        <a:srgbClr val="800080"/>
       </a:folHlink>
     </a:clrScheme>
     <a:fontScheme name="Office">

</xml_diff>